<commit_message>
addition of PGM with attention and mods to gpcpab
</commit_message>
<xml_diff>
--- a/evolution 22 channels so far.pptx
+++ b/evolution 22 channels so far.pptx
@@ -8,6 +8,10 @@
     <p:sldId id="256" r:id="rId2"/>
     <p:sldId id="257" r:id="rId3"/>
     <p:sldId id="258" r:id="rId4"/>
+    <p:sldId id="259" r:id="rId5"/>
+    <p:sldId id="260" r:id="rId6"/>
+    <p:sldId id="261" r:id="rId7"/>
+    <p:sldId id="262" r:id="rId8"/>
   </p:sldIdLst>
   <p:sldSz cx="12192000" cy="6858000"/>
   <p:notesSz cx="6858000" cy="9144000"/>
@@ -106,6 +110,11 @@
       </a:defRPr>
     </a:lvl9pPr>
   </p:defaultTextStyle>
+  <p:extLst>
+    <p:ext uri="{EFAFB233-063F-42B5-8137-9DF3F51BA10A}">
+      <p15:sldGuideLst xmlns:p15="http://schemas.microsoft.com/office/powerpoint/2012/main"/>
+    </p:ext>
+  </p:extLst>
 </p:presentation>
 </file>
 
@@ -258,7 +267,7 @@
           <a:p>
             <a:fld id="{E82B5F7E-5FEE-3F42-B8DC-FB4522826DBE}" type="datetimeFigureOut">
               <a:rPr lang="en-DK" smtClean="0"/>
-              <a:t>24/01/2023</a:t>
+              <a:t>02/02/2023</a:t>
             </a:fld>
             <a:endParaRPr lang="en-DK"/>
           </a:p>
@@ -458,7 +467,7 @@
           <a:p>
             <a:fld id="{E82B5F7E-5FEE-3F42-B8DC-FB4522826DBE}" type="datetimeFigureOut">
               <a:rPr lang="en-DK" smtClean="0"/>
-              <a:t>24/01/2023</a:t>
+              <a:t>02/02/2023</a:t>
             </a:fld>
             <a:endParaRPr lang="en-DK"/>
           </a:p>
@@ -668,7 +677,7 @@
           <a:p>
             <a:fld id="{E82B5F7E-5FEE-3F42-B8DC-FB4522826DBE}" type="datetimeFigureOut">
               <a:rPr lang="en-DK" smtClean="0"/>
-              <a:t>24/01/2023</a:t>
+              <a:t>02/02/2023</a:t>
             </a:fld>
             <a:endParaRPr lang="en-DK"/>
           </a:p>
@@ -868,7 +877,7 @@
           <a:p>
             <a:fld id="{E82B5F7E-5FEE-3F42-B8DC-FB4522826DBE}" type="datetimeFigureOut">
               <a:rPr lang="en-DK" smtClean="0"/>
-              <a:t>24/01/2023</a:t>
+              <a:t>02/02/2023</a:t>
             </a:fld>
             <a:endParaRPr lang="en-DK"/>
           </a:p>
@@ -1144,7 +1153,7 @@
           <a:p>
             <a:fld id="{E82B5F7E-5FEE-3F42-B8DC-FB4522826DBE}" type="datetimeFigureOut">
               <a:rPr lang="en-DK" smtClean="0"/>
-              <a:t>24/01/2023</a:t>
+              <a:t>02/02/2023</a:t>
             </a:fld>
             <a:endParaRPr lang="en-DK"/>
           </a:p>
@@ -1412,7 +1421,7 @@
           <a:p>
             <a:fld id="{E82B5F7E-5FEE-3F42-B8DC-FB4522826DBE}" type="datetimeFigureOut">
               <a:rPr lang="en-DK" smtClean="0"/>
-              <a:t>24/01/2023</a:t>
+              <a:t>02/02/2023</a:t>
             </a:fld>
             <a:endParaRPr lang="en-DK"/>
           </a:p>
@@ -1827,7 +1836,7 @@
           <a:p>
             <a:fld id="{E82B5F7E-5FEE-3F42-B8DC-FB4522826DBE}" type="datetimeFigureOut">
               <a:rPr lang="en-DK" smtClean="0"/>
-              <a:t>24/01/2023</a:t>
+              <a:t>02/02/2023</a:t>
             </a:fld>
             <a:endParaRPr lang="en-DK"/>
           </a:p>
@@ -1969,7 +1978,7 @@
           <a:p>
             <a:fld id="{E82B5F7E-5FEE-3F42-B8DC-FB4522826DBE}" type="datetimeFigureOut">
               <a:rPr lang="en-DK" smtClean="0"/>
-              <a:t>24/01/2023</a:t>
+              <a:t>02/02/2023</a:t>
             </a:fld>
             <a:endParaRPr lang="en-DK"/>
           </a:p>
@@ -2082,7 +2091,7 @@
           <a:p>
             <a:fld id="{E82B5F7E-5FEE-3F42-B8DC-FB4522826DBE}" type="datetimeFigureOut">
               <a:rPr lang="en-DK" smtClean="0"/>
-              <a:t>24/01/2023</a:t>
+              <a:t>02/02/2023</a:t>
             </a:fld>
             <a:endParaRPr lang="en-DK"/>
           </a:p>
@@ -2395,7 +2404,7 @@
           <a:p>
             <a:fld id="{E82B5F7E-5FEE-3F42-B8DC-FB4522826DBE}" type="datetimeFigureOut">
               <a:rPr lang="en-DK" smtClean="0"/>
-              <a:t>24/01/2023</a:t>
+              <a:t>02/02/2023</a:t>
             </a:fld>
             <a:endParaRPr lang="en-DK"/>
           </a:p>
@@ -2684,7 +2693,7 @@
           <a:p>
             <a:fld id="{E82B5F7E-5FEE-3F42-B8DC-FB4522826DBE}" type="datetimeFigureOut">
               <a:rPr lang="en-DK" smtClean="0"/>
-              <a:t>24/01/2023</a:t>
+              <a:t>02/02/2023</a:t>
             </a:fld>
             <a:endParaRPr lang="en-DK"/>
           </a:p>
@@ -2927,7 +2936,7 @@
           <a:p>
             <a:fld id="{E82B5F7E-5FEE-3F42-B8DC-FB4522826DBE}" type="datetimeFigureOut">
               <a:rPr lang="en-DK" smtClean="0"/>
-              <a:t>24/01/2023</a:t>
+              <a:t>02/02/2023</a:t>
             </a:fld>
             <a:endParaRPr lang="en-DK"/>
           </a:p>
@@ -3702,6 +3711,415 @@
 </p:sld>
 </file>
 
+<file path=ppt/slides/slide4.xml><?xml version="1.0" encoding="utf-8"?>
+<p:sld xmlns:a="http://schemas.openxmlformats.org/drawingml/2006/main" xmlns:r="http://schemas.openxmlformats.org/officeDocument/2006/relationships" xmlns:p="http://schemas.openxmlformats.org/presentationml/2006/main">
+  <p:cSld>
+    <p:spTree>
+      <p:nvGrpSpPr>
+        <p:cNvPr id="1" name=""/>
+        <p:cNvGrpSpPr/>
+        <p:nvPr/>
+      </p:nvGrpSpPr>
+      <p:grpSpPr>
+        <a:xfrm>
+          <a:off x="0" y="0"/>
+          <a:ext cx="0" cy="0"/>
+          <a:chOff x="0" y="0"/>
+          <a:chExt cx="0" cy="0"/>
+        </a:xfrm>
+      </p:grpSpPr>
+      <p:sp>
+        <p:nvSpPr>
+          <p:cNvPr id="2" name="Title 1">
+            <a:extLst>
+              <a:ext uri="{FF2B5EF4-FFF2-40B4-BE49-F238E27FC236}">
+                <a16:creationId xmlns:a16="http://schemas.microsoft.com/office/drawing/2014/main" id="{6DE91063-D165-BF9C-1C0B-18AFC3E44338}"/>
+              </a:ext>
+            </a:extLst>
+          </p:cNvPr>
+          <p:cNvSpPr>
+            <a:spLocks noGrp="1"/>
+          </p:cNvSpPr>
+          <p:nvPr>
+            <p:ph type="title"/>
+          </p:nvPr>
+        </p:nvSpPr>
+        <p:spPr>
+          <a:xfrm>
+            <a:off x="1140372" y="2656379"/>
+            <a:ext cx="10515600" cy="1325563"/>
+          </a:xfrm>
+        </p:spPr>
+        <p:txBody>
+          <a:bodyPr/>
+          <a:lstStyle/>
+          <a:p>
+            <a:pPr algn="ctr"/>
+            <a:r>
+              <a:rPr lang="en-DK" dirty="0"/>
+              <a:t>EXPERIMENTS DIFFERENT PADDING STRATEGIES  2 FEB 2023 – Seed Samples</a:t>
+            </a:r>
+          </a:p>
+        </p:txBody>
+      </p:sp>
+    </p:spTree>
+    <p:extLst>
+      <p:ext uri="{BB962C8B-B14F-4D97-AF65-F5344CB8AC3E}">
+        <p14:creationId xmlns:p14="http://schemas.microsoft.com/office/powerpoint/2010/main" val="252743245"/>
+      </p:ext>
+    </p:extLst>
+  </p:cSld>
+  <p:clrMapOvr>
+    <a:masterClrMapping/>
+  </p:clrMapOvr>
+</p:sld>
+</file>
+
+<file path=ppt/slides/slide5.xml><?xml version="1.0" encoding="utf-8"?>
+<p:sld xmlns:a="http://schemas.openxmlformats.org/drawingml/2006/main" xmlns:r="http://schemas.openxmlformats.org/officeDocument/2006/relationships" xmlns:p="http://schemas.openxmlformats.org/presentationml/2006/main">
+  <p:cSld>
+    <p:spTree>
+      <p:nvGrpSpPr>
+        <p:cNvPr id="1" name=""/>
+        <p:cNvGrpSpPr/>
+        <p:nvPr/>
+      </p:nvGrpSpPr>
+      <p:grpSpPr>
+        <a:xfrm>
+          <a:off x="0" y="0"/>
+          <a:ext cx="0" cy="0"/>
+          <a:chOff x="0" y="0"/>
+          <a:chExt cx="0" cy="0"/>
+        </a:xfrm>
+      </p:grpSpPr>
+      <p:sp>
+        <p:nvSpPr>
+          <p:cNvPr id="2" name="Title 1">
+            <a:extLst>
+              <a:ext uri="{FF2B5EF4-FFF2-40B4-BE49-F238E27FC236}">
+                <a16:creationId xmlns:a16="http://schemas.microsoft.com/office/drawing/2014/main" id="{F28163A9-4443-F396-0FDC-49BA07553B63}"/>
+              </a:ext>
+            </a:extLst>
+          </p:cNvPr>
+          <p:cNvSpPr>
+            <a:spLocks noGrp="1"/>
+          </p:cNvSpPr>
+          <p:nvPr>
+            <p:ph type="title"/>
+          </p:nvPr>
+        </p:nvSpPr>
+        <p:spPr>
+          <a:xfrm>
+            <a:off x="0" y="0"/>
+            <a:ext cx="11950840" cy="1325563"/>
+          </a:xfrm>
+        </p:spPr>
+        <p:txBody>
+          <a:bodyPr>
+            <a:normAutofit/>
+          </a:bodyPr>
+          <a:lstStyle/>
+          <a:p>
+            <a:r>
+              <a:rPr lang="en-DK" sz="2800" b="1" dirty="0"/>
+              <a:t>PADDING BOTH CORNERS, EPOCHS=500, LENGTHSCALE =0.5, LR = 1E-4, DIM Z= 60</a:t>
+            </a:r>
+          </a:p>
+        </p:txBody>
+      </p:sp>
+      <p:pic>
+        <p:nvPicPr>
+          <p:cNvPr id="5" name="Picture 4">
+            <a:extLst>
+              <a:ext uri="{FF2B5EF4-FFF2-40B4-BE49-F238E27FC236}">
+                <a16:creationId xmlns:a16="http://schemas.microsoft.com/office/drawing/2014/main" id="{DE075B1F-9609-671B-0850-2BCF837B4CCD}"/>
+              </a:ext>
+            </a:extLst>
+          </p:cNvPr>
+          <p:cNvPicPr>
+            <a:picLocks noChangeAspect="1"/>
+          </p:cNvPicPr>
+          <p:nvPr/>
+        </p:nvPicPr>
+        <p:blipFill>
+          <a:blip r:embed="rId2"/>
+          <a:stretch>
+            <a:fillRect/>
+          </a:stretch>
+        </p:blipFill>
+        <p:spPr>
+          <a:xfrm>
+            <a:off x="6416950" y="1319384"/>
+            <a:ext cx="5402770" cy="4204085"/>
+          </a:xfrm>
+          <a:prstGeom prst="rect">
+            <a:avLst/>
+          </a:prstGeom>
+        </p:spPr>
+      </p:pic>
+      <p:pic>
+        <p:nvPicPr>
+          <p:cNvPr id="6" name="Picture 5">
+            <a:extLst>
+              <a:ext uri="{FF2B5EF4-FFF2-40B4-BE49-F238E27FC236}">
+                <a16:creationId xmlns:a16="http://schemas.microsoft.com/office/drawing/2014/main" id="{88A55939-B122-19E7-4791-9B3338B5CAB8}"/>
+              </a:ext>
+            </a:extLst>
+          </p:cNvPr>
+          <p:cNvPicPr>
+            <a:picLocks noChangeAspect="1"/>
+          </p:cNvPicPr>
+          <p:nvPr/>
+        </p:nvPicPr>
+        <p:blipFill>
+          <a:blip r:embed="rId3"/>
+          <a:stretch>
+            <a:fillRect/>
+          </a:stretch>
+        </p:blipFill>
+        <p:spPr>
+          <a:xfrm>
+            <a:off x="241160" y="1027327"/>
+            <a:ext cx="5684613" cy="4496142"/>
+          </a:xfrm>
+          <a:prstGeom prst="rect">
+            <a:avLst/>
+          </a:prstGeom>
+        </p:spPr>
+      </p:pic>
+    </p:spTree>
+    <p:extLst>
+      <p:ext uri="{BB962C8B-B14F-4D97-AF65-F5344CB8AC3E}">
+        <p14:creationId xmlns:p14="http://schemas.microsoft.com/office/powerpoint/2010/main" val="165060467"/>
+      </p:ext>
+    </p:extLst>
+  </p:cSld>
+  <p:clrMapOvr>
+    <a:masterClrMapping/>
+  </p:clrMapOvr>
+</p:sld>
+</file>
+
+<file path=ppt/slides/slide6.xml><?xml version="1.0" encoding="utf-8"?>
+<p:sld xmlns:a="http://schemas.openxmlformats.org/drawingml/2006/main" xmlns:r="http://schemas.openxmlformats.org/officeDocument/2006/relationships" xmlns:p="http://schemas.openxmlformats.org/presentationml/2006/main">
+  <p:cSld>
+    <p:spTree>
+      <p:nvGrpSpPr>
+        <p:cNvPr id="1" name=""/>
+        <p:cNvGrpSpPr/>
+        <p:nvPr/>
+      </p:nvGrpSpPr>
+      <p:grpSpPr>
+        <a:xfrm>
+          <a:off x="0" y="0"/>
+          <a:ext cx="0" cy="0"/>
+          <a:chOff x="0" y="0"/>
+          <a:chExt cx="0" cy="0"/>
+        </a:xfrm>
+      </p:grpSpPr>
+      <p:sp>
+        <p:nvSpPr>
+          <p:cNvPr id="2" name="Title 1">
+            <a:extLst>
+              <a:ext uri="{FF2B5EF4-FFF2-40B4-BE49-F238E27FC236}">
+                <a16:creationId xmlns:a16="http://schemas.microsoft.com/office/drawing/2014/main" id="{F28163A9-4443-F396-0FDC-49BA07553B63}"/>
+              </a:ext>
+            </a:extLst>
+          </p:cNvPr>
+          <p:cNvSpPr>
+            <a:spLocks noGrp="1"/>
+          </p:cNvSpPr>
+          <p:nvPr>
+            <p:ph type="title"/>
+          </p:nvPr>
+        </p:nvSpPr>
+        <p:spPr>
+          <a:xfrm>
+            <a:off x="0" y="0"/>
+            <a:ext cx="11950840" cy="1325563"/>
+          </a:xfrm>
+        </p:spPr>
+        <p:txBody>
+          <a:bodyPr>
+            <a:normAutofit/>
+          </a:bodyPr>
+          <a:lstStyle/>
+          <a:p>
+            <a:r>
+              <a:rPr lang="en-DK" sz="2800" b="1" dirty="0"/>
+              <a:t>PADDING BOTH CORNERS, EPOCHS=220, LENGTHSCALE =0.5, LR = 1E-4, DIM Z= 60</a:t>
+            </a:r>
+          </a:p>
+        </p:txBody>
+      </p:sp>
+      <p:pic>
+        <p:nvPicPr>
+          <p:cNvPr id="3" name="Picture 2">
+            <a:extLst>
+              <a:ext uri="{FF2B5EF4-FFF2-40B4-BE49-F238E27FC236}">
+                <a16:creationId xmlns:a16="http://schemas.microsoft.com/office/drawing/2014/main" id="{4BE0117D-FC5A-8B69-BA9B-30D85E1E436A}"/>
+              </a:ext>
+            </a:extLst>
+          </p:cNvPr>
+          <p:cNvPicPr>
+            <a:picLocks noChangeAspect="1"/>
+          </p:cNvPicPr>
+          <p:nvPr/>
+        </p:nvPicPr>
+        <p:blipFill>
+          <a:blip r:embed="rId2"/>
+          <a:stretch>
+            <a:fillRect/>
+          </a:stretch>
+        </p:blipFill>
+        <p:spPr>
+          <a:xfrm>
+            <a:off x="139872" y="1076754"/>
+            <a:ext cx="5981452" cy="4730922"/>
+          </a:xfrm>
+          <a:prstGeom prst="rect">
+            <a:avLst/>
+          </a:prstGeom>
+        </p:spPr>
+      </p:pic>
+      <p:pic>
+        <p:nvPicPr>
+          <p:cNvPr id="4" name="Picture 3">
+            <a:extLst>
+              <a:ext uri="{FF2B5EF4-FFF2-40B4-BE49-F238E27FC236}">
+                <a16:creationId xmlns:a16="http://schemas.microsoft.com/office/drawing/2014/main" id="{F34BB36A-7178-8FF7-FEB8-8318DC541595}"/>
+              </a:ext>
+            </a:extLst>
+          </p:cNvPr>
+          <p:cNvPicPr>
+            <a:picLocks noChangeAspect="1"/>
+          </p:cNvPicPr>
+          <p:nvPr/>
+        </p:nvPicPr>
+        <p:blipFill>
+          <a:blip r:embed="rId3"/>
+          <a:stretch>
+            <a:fillRect/>
+          </a:stretch>
+        </p:blipFill>
+        <p:spPr>
+          <a:xfrm>
+            <a:off x="6261196" y="1521597"/>
+            <a:ext cx="5666942" cy="4409646"/>
+          </a:xfrm>
+          <a:prstGeom prst="rect">
+            <a:avLst/>
+          </a:prstGeom>
+        </p:spPr>
+      </p:pic>
+    </p:spTree>
+    <p:extLst>
+      <p:ext uri="{BB962C8B-B14F-4D97-AF65-F5344CB8AC3E}">
+        <p14:creationId xmlns:p14="http://schemas.microsoft.com/office/powerpoint/2010/main" val="2620614515"/>
+      </p:ext>
+    </p:extLst>
+  </p:cSld>
+  <p:clrMapOvr>
+    <a:masterClrMapping/>
+  </p:clrMapOvr>
+</p:sld>
+</file>
+
+<file path=ppt/slides/slide7.xml><?xml version="1.0" encoding="utf-8"?>
+<p:sld xmlns:a="http://schemas.openxmlformats.org/drawingml/2006/main" xmlns:r="http://schemas.openxmlformats.org/officeDocument/2006/relationships" xmlns:p="http://schemas.openxmlformats.org/presentationml/2006/main">
+  <p:cSld>
+    <p:spTree>
+      <p:nvGrpSpPr>
+        <p:cNvPr id="1" name=""/>
+        <p:cNvGrpSpPr/>
+        <p:nvPr/>
+      </p:nvGrpSpPr>
+      <p:grpSpPr>
+        <a:xfrm>
+          <a:off x="0" y="0"/>
+          <a:ext cx="0" cy="0"/>
+          <a:chOff x="0" y="0"/>
+          <a:chExt cx="0" cy="0"/>
+        </a:xfrm>
+      </p:grpSpPr>
+      <p:sp>
+        <p:nvSpPr>
+          <p:cNvPr id="2" name="Title 1">
+            <a:extLst>
+              <a:ext uri="{FF2B5EF4-FFF2-40B4-BE49-F238E27FC236}">
+                <a16:creationId xmlns:a16="http://schemas.microsoft.com/office/drawing/2014/main" id="{F28163A9-4443-F396-0FDC-49BA07553B63}"/>
+              </a:ext>
+            </a:extLst>
+          </p:cNvPr>
+          <p:cNvSpPr>
+            <a:spLocks noGrp="1"/>
+          </p:cNvSpPr>
+          <p:nvPr>
+            <p:ph type="title"/>
+          </p:nvPr>
+        </p:nvSpPr>
+        <p:spPr>
+          <a:xfrm>
+            <a:off x="0" y="0"/>
+            <a:ext cx="11950840" cy="1325563"/>
+          </a:xfrm>
+        </p:spPr>
+        <p:txBody>
+          <a:bodyPr>
+            <a:normAutofit/>
+          </a:bodyPr>
+          <a:lstStyle/>
+          <a:p>
+            <a:r>
+              <a:rPr lang="en-DK" sz="2800" b="1" dirty="0"/>
+              <a:t>RANDOM PADDING, EPOCHS=500, LENGTHSCALE =0.5, LR = 1E-4, DIM Z= 60</a:t>
+            </a:r>
+          </a:p>
+        </p:txBody>
+      </p:sp>
+      <p:pic>
+        <p:nvPicPr>
+          <p:cNvPr id="5" name="Picture 4">
+            <a:extLst>
+              <a:ext uri="{FF2B5EF4-FFF2-40B4-BE49-F238E27FC236}">
+                <a16:creationId xmlns:a16="http://schemas.microsoft.com/office/drawing/2014/main" id="{6D184EFF-2A7C-F7F2-0B8F-AC461BFFB4D6}"/>
+              </a:ext>
+            </a:extLst>
+          </p:cNvPr>
+          <p:cNvPicPr>
+            <a:picLocks noChangeAspect="1"/>
+          </p:cNvPicPr>
+          <p:nvPr/>
+        </p:nvPicPr>
+        <p:blipFill>
+          <a:blip r:embed="rId2"/>
+          <a:stretch>
+            <a:fillRect/>
+          </a:stretch>
+        </p:blipFill>
+        <p:spPr>
+          <a:xfrm>
+            <a:off x="6096000" y="1509240"/>
+            <a:ext cx="5905141" cy="4594997"/>
+          </a:xfrm>
+          <a:prstGeom prst="rect">
+            <a:avLst/>
+          </a:prstGeom>
+        </p:spPr>
+      </p:pic>
+    </p:spTree>
+    <p:extLst>
+      <p:ext uri="{BB962C8B-B14F-4D97-AF65-F5344CB8AC3E}">
+        <p14:creationId xmlns:p14="http://schemas.microsoft.com/office/powerpoint/2010/main" val="2610490952"/>
+      </p:ext>
+    </p:extLst>
+  </p:cSld>
+  <p:clrMapOvr>
+    <a:masterClrMapping/>
+  </p:clrMapOvr>
+</p:sld>
+</file>
+
 <file path=ppt/theme/theme1.xml><?xml version="1.0" encoding="utf-8"?>
 <a:theme xmlns:a="http://schemas.openxmlformats.org/drawingml/2006/main" name="Office Theme">
   <a:themeElements>

</xml_diff>